<commit_message>
new colors and new icon
</commit_message>
<xml_diff>
--- a/symbols.pptx
+++ b/symbols.pptx
@@ -9,6 +9,7 @@
     <p:sldId id="257" r:id="rId3"/>
     <p:sldId id="258" r:id="rId4"/>
     <p:sldId id="259" r:id="rId5"/>
+    <p:sldId id="260" r:id="rId6"/>
   </p:sldIdLst>
   <p:sldSz cx="9144000" cy="6858000" type="screen4x3"/>
   <p:notesSz cx="6858000" cy="9144000"/>
@@ -291,7 +292,7 @@
           <a:p>
             <a:fld id="{4606BDE2-0170-124B-BE04-295401397446}" type="datetimeFigureOut">
               <a:rPr lang="en-US" smtClean="0"/>
-              <a:t>30/05/16</a:t>
+              <a:t>06/06/16</a:t>
             </a:fld>
             <a:endParaRPr lang="en-US"/>
           </a:p>
@@ -461,7 +462,7 @@
           <a:p>
             <a:fld id="{4606BDE2-0170-124B-BE04-295401397446}" type="datetimeFigureOut">
               <a:rPr lang="en-US" smtClean="0"/>
-              <a:t>30/05/16</a:t>
+              <a:t>06/06/16</a:t>
             </a:fld>
             <a:endParaRPr lang="en-US"/>
           </a:p>
@@ -641,7 +642,7 @@
           <a:p>
             <a:fld id="{4606BDE2-0170-124B-BE04-295401397446}" type="datetimeFigureOut">
               <a:rPr lang="en-US" smtClean="0"/>
-              <a:t>30/05/16</a:t>
+              <a:t>06/06/16</a:t>
             </a:fld>
             <a:endParaRPr lang="en-US"/>
           </a:p>
@@ -811,7 +812,7 @@
           <a:p>
             <a:fld id="{4606BDE2-0170-124B-BE04-295401397446}" type="datetimeFigureOut">
               <a:rPr lang="en-US" smtClean="0"/>
-              <a:t>30/05/16</a:t>
+              <a:t>06/06/16</a:t>
             </a:fld>
             <a:endParaRPr lang="en-US"/>
           </a:p>
@@ -1057,7 +1058,7 @@
           <a:p>
             <a:fld id="{4606BDE2-0170-124B-BE04-295401397446}" type="datetimeFigureOut">
               <a:rPr lang="en-US" smtClean="0"/>
-              <a:t>30/05/16</a:t>
+              <a:t>06/06/16</a:t>
             </a:fld>
             <a:endParaRPr lang="en-US"/>
           </a:p>
@@ -1345,7 +1346,7 @@
           <a:p>
             <a:fld id="{4606BDE2-0170-124B-BE04-295401397446}" type="datetimeFigureOut">
               <a:rPr lang="en-US" smtClean="0"/>
-              <a:t>30/05/16</a:t>
+              <a:t>06/06/16</a:t>
             </a:fld>
             <a:endParaRPr lang="en-US"/>
           </a:p>
@@ -1767,7 +1768,7 @@
           <a:p>
             <a:fld id="{4606BDE2-0170-124B-BE04-295401397446}" type="datetimeFigureOut">
               <a:rPr lang="en-US" smtClean="0"/>
-              <a:t>30/05/16</a:t>
+              <a:t>06/06/16</a:t>
             </a:fld>
             <a:endParaRPr lang="en-US"/>
           </a:p>
@@ -1885,7 +1886,7 @@
           <a:p>
             <a:fld id="{4606BDE2-0170-124B-BE04-295401397446}" type="datetimeFigureOut">
               <a:rPr lang="en-US" smtClean="0"/>
-              <a:t>30/05/16</a:t>
+              <a:t>06/06/16</a:t>
             </a:fld>
             <a:endParaRPr lang="en-US"/>
           </a:p>
@@ -1980,7 +1981,7 @@
           <a:p>
             <a:fld id="{4606BDE2-0170-124B-BE04-295401397446}" type="datetimeFigureOut">
               <a:rPr lang="en-US" smtClean="0"/>
-              <a:t>30/05/16</a:t>
+              <a:t>06/06/16</a:t>
             </a:fld>
             <a:endParaRPr lang="en-US"/>
           </a:p>
@@ -2257,7 +2258,7 @@
           <a:p>
             <a:fld id="{4606BDE2-0170-124B-BE04-295401397446}" type="datetimeFigureOut">
               <a:rPr lang="en-US" smtClean="0"/>
-              <a:t>30/05/16</a:t>
+              <a:t>06/06/16</a:t>
             </a:fld>
             <a:endParaRPr lang="en-US"/>
           </a:p>
@@ -2510,7 +2511,7 @@
           <a:p>
             <a:fld id="{4606BDE2-0170-124B-BE04-295401397446}" type="datetimeFigureOut">
               <a:rPr lang="en-US" smtClean="0"/>
-              <a:t>30/05/16</a:t>
+              <a:t>06/06/16</a:t>
             </a:fld>
             <a:endParaRPr lang="en-US"/>
           </a:p>
@@ -2723,7 +2724,7 @@
           <a:p>
             <a:fld id="{4606BDE2-0170-124B-BE04-295401397446}" type="datetimeFigureOut">
               <a:rPr lang="en-US" smtClean="0"/>
-              <a:t>30/05/16</a:t>
+              <a:t>06/06/16</a:t>
             </a:fld>
             <a:endParaRPr lang="en-US"/>
           </a:p>
@@ -4706,6 +4707,397 @@
     <p:extLst>
       <p:ext uri="{BB962C8B-B14F-4D97-AF65-F5344CB8AC3E}">
         <p14:creationId xmlns:p14="http://schemas.microsoft.com/office/powerpoint/2010/main" val="2523736431"/>
+      </p:ext>
+    </p:extLst>
+  </p:cSld>
+  <p:clrMapOvr>
+    <a:masterClrMapping/>
+  </p:clrMapOvr>
+</p:sld>
+</file>
+
+<file path=ppt/slides/slide5.xml><?xml version="1.0" encoding="utf-8"?>
+<p:sld xmlns:a="http://schemas.openxmlformats.org/drawingml/2006/main" xmlns:r="http://schemas.openxmlformats.org/officeDocument/2006/relationships" xmlns:p="http://schemas.openxmlformats.org/presentationml/2006/main">
+  <p:cSld>
+    <p:spTree>
+      <p:nvGrpSpPr>
+        <p:cNvPr id="1" name=""/>
+        <p:cNvGrpSpPr/>
+        <p:nvPr/>
+      </p:nvGrpSpPr>
+      <p:grpSpPr>
+        <a:xfrm>
+          <a:off x="0" y="0"/>
+          <a:ext cx="0" cy="0"/>
+          <a:chOff x="0" y="0"/>
+          <a:chExt cx="0" cy="0"/>
+        </a:xfrm>
+      </p:grpSpPr>
+      <p:pic>
+        <p:nvPicPr>
+          <p:cNvPr id="3" name="Picture 2" descr="Simulator Screen Shot 06 Jun 2016 22.24.53.png"/>
+          <p:cNvPicPr>
+            <a:picLocks noChangeAspect="1"/>
+          </p:cNvPicPr>
+          <p:nvPr/>
+        </p:nvPicPr>
+        <p:blipFill rotWithShape="1">
+          <a:blip r:embed="rId2">
+            <a:extLst>
+              <a:ext uri="{28A0092B-C50C-407E-A947-70E740481C1C}">
+                <a14:useLocalDpi xmlns:a14="http://schemas.microsoft.com/office/drawing/2010/main" val="0"/>
+              </a:ext>
+            </a:extLst>
+          </a:blip>
+          <a:srcRect l="75798" t="30511" r="13949" b="64411"/>
+          <a:stretch/>
+        </p:blipFill>
+        <p:spPr>
+          <a:xfrm>
+            <a:off x="2689093" y="1785515"/>
+            <a:ext cx="3035963" cy="3035961"/>
+          </a:xfrm>
+          <a:prstGeom prst="rect">
+            <a:avLst/>
+          </a:prstGeom>
+        </p:spPr>
+      </p:pic>
+      <p:sp>
+        <p:nvSpPr>
+          <p:cNvPr id="18" name="Rectangle 17"/>
+          <p:cNvSpPr/>
+          <p:nvPr/>
+        </p:nvSpPr>
+        <p:spPr>
+          <a:xfrm>
+            <a:off x="4209778" y="3300776"/>
+            <a:ext cx="1515277" cy="1517979"/>
+          </a:xfrm>
+          <a:prstGeom prst="rect">
+            <a:avLst/>
+          </a:prstGeom>
+          <a:solidFill>
+            <a:schemeClr val="bg1">
+              <a:lumMod val="65000"/>
+            </a:schemeClr>
+          </a:solidFill>
+          <a:ln>
+            <a:noFill/>
+          </a:ln>
+          <a:effectLst/>
+        </p:spPr>
+        <p:style>
+          <a:lnRef idx="1">
+            <a:schemeClr val="accent1"/>
+          </a:lnRef>
+          <a:fillRef idx="3">
+            <a:schemeClr val="accent1"/>
+          </a:fillRef>
+          <a:effectRef idx="2">
+            <a:schemeClr val="accent1"/>
+          </a:effectRef>
+          <a:fontRef idx="minor">
+            <a:schemeClr val="lt1"/>
+          </a:fontRef>
+        </p:style>
+        <p:txBody>
+          <a:bodyPr rtlCol="0" anchor="ctr"/>
+          <a:lstStyle/>
+          <a:p>
+            <a:pPr algn="ctr"/>
+            <a:endParaRPr lang="en-US"/>
+          </a:p>
+        </p:txBody>
+      </p:sp>
+      <p:cxnSp>
+        <p:nvCxnSpPr>
+          <p:cNvPr id="8" name="Straight Connector 7"/>
+          <p:cNvCxnSpPr/>
+          <p:nvPr/>
+        </p:nvCxnSpPr>
+        <p:spPr>
+          <a:xfrm>
+            <a:off x="4209778" y="1782794"/>
+            <a:ext cx="0" cy="3035961"/>
+          </a:xfrm>
+          <a:prstGeom prst="line">
+            <a:avLst/>
+          </a:prstGeom>
+          <a:ln w="57150" cmpd="sng">
+            <a:solidFill>
+              <a:schemeClr val="tx1">
+                <a:lumMod val="75000"/>
+                <a:lumOff val="25000"/>
+              </a:schemeClr>
+            </a:solidFill>
+          </a:ln>
+          <a:effectLst/>
+        </p:spPr>
+        <p:style>
+          <a:lnRef idx="2">
+            <a:schemeClr val="accent1"/>
+          </a:lnRef>
+          <a:fillRef idx="0">
+            <a:schemeClr val="accent1"/>
+          </a:fillRef>
+          <a:effectRef idx="1">
+            <a:schemeClr val="accent1"/>
+          </a:effectRef>
+          <a:fontRef idx="minor">
+            <a:schemeClr val="tx1"/>
+          </a:fontRef>
+        </p:style>
+      </p:cxnSp>
+      <p:cxnSp>
+        <p:nvCxnSpPr>
+          <p:cNvPr id="13" name="Straight Connector 12"/>
+          <p:cNvCxnSpPr/>
+          <p:nvPr/>
+        </p:nvCxnSpPr>
+        <p:spPr>
+          <a:xfrm rot="16200000">
+            <a:off x="4207074" y="1782795"/>
+            <a:ext cx="0" cy="3035961"/>
+          </a:xfrm>
+          <a:prstGeom prst="line">
+            <a:avLst/>
+          </a:prstGeom>
+          <a:ln w="57150" cmpd="sng">
+            <a:solidFill>
+              <a:schemeClr val="tx1">
+                <a:lumMod val="75000"/>
+                <a:lumOff val="25000"/>
+              </a:schemeClr>
+            </a:solidFill>
+          </a:ln>
+          <a:effectLst/>
+        </p:spPr>
+        <p:style>
+          <a:lnRef idx="2">
+            <a:schemeClr val="accent1"/>
+          </a:lnRef>
+          <a:fillRef idx="0">
+            <a:schemeClr val="accent1"/>
+          </a:fillRef>
+          <a:effectRef idx="1">
+            <a:schemeClr val="accent1"/>
+          </a:effectRef>
+          <a:fontRef idx="minor">
+            <a:schemeClr val="tx1"/>
+          </a:fontRef>
+        </p:style>
+      </p:cxnSp>
+      <p:sp>
+        <p:nvSpPr>
+          <p:cNvPr id="14" name="TextBox 13"/>
+          <p:cNvSpPr txBox="1"/>
+          <p:nvPr/>
+        </p:nvSpPr>
+        <p:spPr>
+          <a:xfrm>
+            <a:off x="3121514" y="3175515"/>
+            <a:ext cx="610731" cy="1569660"/>
+          </a:xfrm>
+          <a:prstGeom prst="rect">
+            <a:avLst/>
+          </a:prstGeom>
+          <a:noFill/>
+        </p:spPr>
+        <p:txBody>
+          <a:bodyPr wrap="square" rtlCol="0">
+            <a:spAutoFit/>
+          </a:bodyPr>
+          <a:lstStyle/>
+          <a:p>
+            <a:r>
+              <a:rPr lang="en-US" sz="9600" dirty="0">
+                <a:solidFill>
+                  <a:schemeClr val="bg1"/>
+                </a:solidFill>
+              </a:rPr>
+              <a:t>×</a:t>
+            </a:r>
+          </a:p>
+        </p:txBody>
+      </p:sp>
+      <p:sp>
+        <p:nvSpPr>
+          <p:cNvPr id="15" name="TextBox 14"/>
+          <p:cNvSpPr txBox="1"/>
+          <p:nvPr/>
+        </p:nvSpPr>
+        <p:spPr>
+          <a:xfrm>
+            <a:off x="3121514" y="1670070"/>
+            <a:ext cx="610731" cy="1569660"/>
+          </a:xfrm>
+          <a:prstGeom prst="rect">
+            <a:avLst/>
+          </a:prstGeom>
+          <a:noFill/>
+        </p:spPr>
+        <p:txBody>
+          <a:bodyPr wrap="square" rtlCol="0">
+            <a:spAutoFit/>
+          </a:bodyPr>
+          <a:lstStyle/>
+          <a:p>
+            <a:r>
+              <a:rPr lang="en-US" sz="9600" dirty="0">
+                <a:solidFill>
+                  <a:schemeClr val="bg1"/>
+                </a:solidFill>
+              </a:rPr>
+              <a:t>÷</a:t>
+            </a:r>
+          </a:p>
+        </p:txBody>
+      </p:sp>
+      <p:sp>
+        <p:nvSpPr>
+          <p:cNvPr id="16" name="TextBox 15"/>
+          <p:cNvSpPr txBox="1"/>
+          <p:nvPr/>
+        </p:nvSpPr>
+        <p:spPr>
+          <a:xfrm>
+            <a:off x="4582623" y="1670070"/>
+            <a:ext cx="610731" cy="1569660"/>
+          </a:xfrm>
+          <a:prstGeom prst="rect">
+            <a:avLst/>
+          </a:prstGeom>
+          <a:noFill/>
+        </p:spPr>
+        <p:txBody>
+          <a:bodyPr wrap="square" rtlCol="0">
+            <a:spAutoFit/>
+          </a:bodyPr>
+          <a:lstStyle/>
+          <a:p>
+            <a:r>
+              <a:rPr lang="en-US" sz="9600" dirty="0">
+                <a:solidFill>
+                  <a:schemeClr val="bg1"/>
+                </a:solidFill>
+              </a:rPr>
+              <a:t>−</a:t>
+            </a:r>
+          </a:p>
+        </p:txBody>
+      </p:sp>
+      <p:sp>
+        <p:nvSpPr>
+          <p:cNvPr id="17" name="TextBox 16"/>
+          <p:cNvSpPr txBox="1"/>
+          <p:nvPr/>
+        </p:nvSpPr>
+        <p:spPr>
+          <a:xfrm>
+            <a:off x="4582623" y="3172404"/>
+            <a:ext cx="610731" cy="1569660"/>
+          </a:xfrm>
+          <a:prstGeom prst="rect">
+            <a:avLst/>
+          </a:prstGeom>
+          <a:noFill/>
+        </p:spPr>
+        <p:txBody>
+          <a:bodyPr wrap="square" rtlCol="0">
+            <a:spAutoFit/>
+          </a:bodyPr>
+          <a:lstStyle/>
+          <a:p>
+            <a:r>
+              <a:rPr lang="en-US" sz="9600" dirty="0">
+                <a:solidFill>
+                  <a:schemeClr val="bg1"/>
+                </a:solidFill>
+              </a:rPr>
+              <a:t>=</a:t>
+            </a:r>
+          </a:p>
+        </p:txBody>
+      </p:sp>
+      <p:sp>
+        <p:nvSpPr>
+          <p:cNvPr id="19" name="Right Triangle 18"/>
+          <p:cNvSpPr/>
+          <p:nvPr/>
+        </p:nvSpPr>
+        <p:spPr>
+          <a:xfrm rot="5400000">
+            <a:off x="2689093" y="1780758"/>
+            <a:ext cx="1896029" cy="1896029"/>
+          </a:xfrm>
+          <a:prstGeom prst="rtTriangle">
+            <a:avLst/>
+          </a:prstGeom>
+          <a:solidFill>
+            <a:srgbClr val="FFFF00"/>
+          </a:solidFill>
+          <a:ln>
+            <a:noFill/>
+          </a:ln>
+          <a:effectLst/>
+        </p:spPr>
+        <p:style>
+          <a:lnRef idx="1">
+            <a:schemeClr val="accent1"/>
+          </a:lnRef>
+          <a:fillRef idx="3">
+            <a:schemeClr val="accent1"/>
+          </a:fillRef>
+          <a:effectRef idx="2">
+            <a:schemeClr val="accent1"/>
+          </a:effectRef>
+          <a:fontRef idx="minor">
+            <a:schemeClr val="lt1"/>
+          </a:fontRef>
+        </p:style>
+        <p:txBody>
+          <a:bodyPr rtlCol="0" anchor="ctr"/>
+          <a:lstStyle/>
+          <a:p>
+            <a:pPr algn="ctr"/>
+            <a:endParaRPr lang="en-US"/>
+          </a:p>
+        </p:txBody>
+      </p:sp>
+      <p:sp>
+        <p:nvSpPr>
+          <p:cNvPr id="20" name="TextBox 19"/>
+          <p:cNvSpPr txBox="1"/>
+          <p:nvPr/>
+        </p:nvSpPr>
+        <p:spPr>
+          <a:xfrm rot="18900000">
+            <a:off x="2539598" y="1966908"/>
+            <a:ext cx="1678631" cy="923330"/>
+          </a:xfrm>
+          <a:prstGeom prst="rect">
+            <a:avLst/>
+          </a:prstGeom>
+          <a:noFill/>
+        </p:spPr>
+        <p:txBody>
+          <a:bodyPr wrap="square" rtlCol="0">
+            <a:spAutoFit/>
+          </a:bodyPr>
+          <a:lstStyle/>
+          <a:p>
+            <a:r>
+              <a:rPr lang="en-US" sz="5400" b="1" dirty="0" smtClean="0"/>
+              <a:t>GMP</a:t>
+            </a:r>
+            <a:endParaRPr lang="en-US" sz="5400" b="1" dirty="0"/>
+          </a:p>
+        </p:txBody>
+      </p:sp>
+    </p:spTree>
+    <p:extLst>
+      <p:ext uri="{BB962C8B-B14F-4D97-AF65-F5344CB8AC3E}">
+        <p14:creationId xmlns:p14="http://schemas.microsoft.com/office/powerpoint/2010/main" val="929711419"/>
       </p:ext>
     </p:extLst>
   </p:cSld>

</xml_diff>